<commit_message>
biopython slides no longer have scripting
</commit_message>
<xml_diff>
--- a/slides/slides_biopython.pptx
+++ b/slides/slides_biopython.pptx
@@ -5,7 +5,7 @@
     <p:sldMasterId id="2147483660" r:id="rId1"/>
   </p:sldMasterIdLst>
   <p:notesMasterIdLst>
-    <p:notesMasterId r:id="rId36"/>
+    <p:notesMasterId r:id="rId27"/>
   </p:notesMasterIdLst>
   <p:sldIdLst>
     <p:sldId id="256" r:id="rId2"/>
@@ -33,15 +33,6 @@
     <p:sldId id="519" r:id="rId24"/>
     <p:sldId id="483" r:id="rId25"/>
     <p:sldId id="482" r:id="rId26"/>
-    <p:sldId id="488" r:id="rId27"/>
-    <p:sldId id="501" r:id="rId28"/>
-    <p:sldId id="495" r:id="rId29"/>
-    <p:sldId id="502" r:id="rId30"/>
-    <p:sldId id="498" r:id="rId31"/>
-    <p:sldId id="499" r:id="rId32"/>
-    <p:sldId id="494" r:id="rId33"/>
-    <p:sldId id="500" r:id="rId34"/>
-    <p:sldId id="496" r:id="rId35"/>
   </p:sldIdLst>
   <p:sldSz cx="9144000" cy="6858000" type="screen4x3"/>
   <p:notesSz cx="6858000" cy="9144000"/>
@@ -8170,426 +8161,6 @@
 </p:sld>
 </file>
 
-<file path=ppt/slides/slide26.xml><?xml version="1.0" encoding="utf-8"?>
-<p:sld xmlns:a="http://schemas.openxmlformats.org/drawingml/2006/main" xmlns:r="http://schemas.openxmlformats.org/officeDocument/2006/relationships" xmlns:p="http://schemas.openxmlformats.org/presentationml/2006/main">
-  <p:cSld>
-    <p:spTree>
-      <p:nvGrpSpPr>
-        <p:cNvPr id="1" name=""/>
-        <p:cNvGrpSpPr/>
-        <p:nvPr/>
-      </p:nvGrpSpPr>
-      <p:grpSpPr>
-        <a:xfrm>
-          <a:off x="0" y="0"/>
-          <a:ext cx="0" cy="0"/>
-          <a:chOff x="0" y="0"/>
-          <a:chExt cx="0" cy="0"/>
-        </a:xfrm>
-      </p:grpSpPr>
-      <p:sp>
-        <p:nvSpPr>
-          <p:cNvPr id="2" name="Title 1"/>
-          <p:cNvSpPr>
-            <a:spLocks noGrp="1"/>
-          </p:cNvSpPr>
-          <p:nvPr>
-            <p:ph type="title"/>
-          </p:nvPr>
-        </p:nvSpPr>
-        <p:spPr/>
-        <p:txBody>
-          <a:bodyPr/>
-          <a:lstStyle/>
-          <a:p>
-            <a:r>
-              <a:rPr lang="en-US" dirty="0" smtClean="0"/>
-              <a:t>scripting Exercises</a:t>
-            </a:r>
-            <a:endParaRPr lang="en-US" dirty="0"/>
-          </a:p>
-        </p:txBody>
-      </p:sp>
-      <p:sp>
-        <p:nvSpPr>
-          <p:cNvPr id="3" name="Content Placeholder 2"/>
-          <p:cNvSpPr>
-            <a:spLocks noGrp="1"/>
-          </p:cNvSpPr>
-          <p:nvPr>
-            <p:ph idx="1"/>
-          </p:nvPr>
-        </p:nvSpPr>
-        <p:spPr/>
-        <p:txBody>
-          <a:bodyPr/>
-          <a:lstStyle/>
-          <a:p>
-            <a:r>
-              <a:rPr lang="en-US" dirty="0" smtClean="0"/>
-              <a:t>Goal</a:t>
-            </a:r>
-            <a:r>
-              <a:rPr lang="en-US" dirty="0" smtClean="0"/>
-              <a:t>:</a:t>
-            </a:r>
-          </a:p>
-          <a:p>
-            <a:pPr marL="457200" indent="-457200">
-              <a:buFont typeface="Arial"/>
-              <a:buChar char="•"/>
-            </a:pPr>
-            <a:r>
-              <a:rPr lang="en-US" dirty="0" smtClean="0"/>
-              <a:t>Parse sequence data files and extract meaningful information </a:t>
-            </a:r>
-          </a:p>
-          <a:p>
-            <a:pPr marL="457200" indent="-457200">
-              <a:buFont typeface="Arial"/>
-              <a:buChar char="•"/>
-            </a:pPr>
-            <a:r>
-              <a:rPr lang="en-US" dirty="0" smtClean="0"/>
-              <a:t>Perform some calculations</a:t>
-            </a:r>
-          </a:p>
-        </p:txBody>
-      </p:sp>
-    </p:spTree>
-    <p:extLst>
-      <p:ext uri="{BB962C8B-B14F-4D97-AF65-F5344CB8AC3E}">
-        <p14:creationId xmlns:p14="http://schemas.microsoft.com/office/powerpoint/2010/main" val="1028846082"/>
-      </p:ext>
-    </p:extLst>
-  </p:cSld>
-  <p:clrMapOvr>
-    <a:masterClrMapping/>
-  </p:clrMapOvr>
-</p:sld>
-</file>
-
-<file path=ppt/slides/slide27.xml><?xml version="1.0" encoding="utf-8"?>
-<p:sld xmlns:a="http://schemas.openxmlformats.org/drawingml/2006/main" xmlns:r="http://schemas.openxmlformats.org/officeDocument/2006/relationships" xmlns:p="http://schemas.openxmlformats.org/presentationml/2006/main">
-  <p:cSld>
-    <p:spTree>
-      <p:nvGrpSpPr>
-        <p:cNvPr id="1" name=""/>
-        <p:cNvGrpSpPr/>
-        <p:nvPr/>
-      </p:nvGrpSpPr>
-      <p:grpSpPr>
-        <a:xfrm>
-          <a:off x="0" y="0"/>
-          <a:ext cx="0" cy="0"/>
-          <a:chOff x="0" y="0"/>
-          <a:chExt cx="0" cy="0"/>
-        </a:xfrm>
-      </p:grpSpPr>
-      <p:sp>
-        <p:nvSpPr>
-          <p:cNvPr id="2" name="Title 1"/>
-          <p:cNvSpPr>
-            <a:spLocks noGrp="1"/>
-          </p:cNvSpPr>
-          <p:nvPr>
-            <p:ph type="title"/>
-          </p:nvPr>
-        </p:nvSpPr>
-        <p:spPr/>
-        <p:txBody>
-          <a:bodyPr/>
-          <a:lstStyle/>
-          <a:p>
-            <a:r>
-              <a:rPr lang="en-US" dirty="0" smtClean="0"/>
-              <a:t>Script #1</a:t>
-            </a:r>
-            <a:endParaRPr lang="en-US" dirty="0"/>
-          </a:p>
-        </p:txBody>
-      </p:sp>
-      <p:sp>
-        <p:nvSpPr>
-          <p:cNvPr id="3" name="Content Placeholder 2"/>
-          <p:cNvSpPr>
-            <a:spLocks noGrp="1"/>
-          </p:cNvSpPr>
-          <p:nvPr>
-            <p:ph idx="1"/>
-          </p:nvPr>
-        </p:nvSpPr>
-        <p:spPr/>
-        <p:txBody>
-          <a:bodyPr/>
-          <a:lstStyle/>
-          <a:p>
-            <a:r>
-              <a:rPr lang="en-US" dirty="0"/>
-              <a:t>Determine the average </a:t>
-            </a:r>
-            <a:r>
-              <a:rPr lang="en-US" i="1" dirty="0"/>
-              <a:t>GC-content </a:t>
-            </a:r>
-            <a:r>
-              <a:rPr lang="en-US" dirty="0"/>
-              <a:t>for all sequences in a given file</a:t>
-            </a:r>
-          </a:p>
-          <a:p>
-            <a:endParaRPr lang="en-US" dirty="0" smtClean="0"/>
-          </a:p>
-          <a:p>
-            <a:endParaRPr lang="en-US" dirty="0"/>
-          </a:p>
-          <a:p>
-            <a:endParaRPr lang="en-US" dirty="0"/>
-          </a:p>
-        </p:txBody>
-      </p:sp>
-    </p:spTree>
-    <p:extLst>
-      <p:ext uri="{BB962C8B-B14F-4D97-AF65-F5344CB8AC3E}">
-        <p14:creationId xmlns:p14="http://schemas.microsoft.com/office/powerpoint/2010/main" val="81387370"/>
-      </p:ext>
-    </p:extLst>
-  </p:cSld>
-  <p:clrMapOvr>
-    <a:masterClrMapping/>
-  </p:clrMapOvr>
-</p:sld>
-</file>
-
-<file path=ppt/slides/slide28.xml><?xml version="1.0" encoding="utf-8"?>
-<p:sld xmlns:a="http://schemas.openxmlformats.org/drawingml/2006/main" xmlns:r="http://schemas.openxmlformats.org/officeDocument/2006/relationships" xmlns:p="http://schemas.openxmlformats.org/presentationml/2006/main">
-  <p:cSld>
-    <p:spTree>
-      <p:nvGrpSpPr>
-        <p:cNvPr id="1" name=""/>
-        <p:cNvGrpSpPr/>
-        <p:nvPr/>
-      </p:nvGrpSpPr>
-      <p:grpSpPr>
-        <a:xfrm>
-          <a:off x="0" y="0"/>
-          <a:ext cx="0" cy="0"/>
-          <a:chOff x="0" y="0"/>
-          <a:chExt cx="0" cy="0"/>
-        </a:xfrm>
-      </p:grpSpPr>
-      <p:sp>
-        <p:nvSpPr>
-          <p:cNvPr id="2" name="Title 1"/>
-          <p:cNvSpPr>
-            <a:spLocks noGrp="1"/>
-          </p:cNvSpPr>
-          <p:nvPr>
-            <p:ph type="title"/>
-          </p:nvPr>
-        </p:nvSpPr>
-        <p:spPr/>
-        <p:txBody>
-          <a:bodyPr/>
-          <a:lstStyle/>
-          <a:p>
-            <a:r>
-              <a:rPr lang="en-US" dirty="0" smtClean="0"/>
-              <a:t>Script #1</a:t>
-            </a:r>
-            <a:endParaRPr lang="en-US" dirty="0"/>
-          </a:p>
-        </p:txBody>
-      </p:sp>
-      <p:sp>
-        <p:nvSpPr>
-          <p:cNvPr id="3" name="Content Placeholder 2"/>
-          <p:cNvSpPr>
-            <a:spLocks noGrp="1"/>
-          </p:cNvSpPr>
-          <p:nvPr>
-            <p:ph idx="1"/>
-          </p:nvPr>
-        </p:nvSpPr>
-        <p:spPr/>
-        <p:txBody>
-          <a:bodyPr/>
-          <a:lstStyle/>
-          <a:p>
-            <a:r>
-              <a:rPr lang="en-US" dirty="0" smtClean="0"/>
-              <a:t>Determine </a:t>
-            </a:r>
-            <a:r>
-              <a:rPr lang="en-US" dirty="0"/>
-              <a:t>the </a:t>
-            </a:r>
-            <a:r>
-              <a:rPr lang="en-US" dirty="0" smtClean="0"/>
-              <a:t>average </a:t>
-            </a:r>
-            <a:r>
-              <a:rPr lang="en-US" i="1" dirty="0" smtClean="0"/>
-              <a:t>GC-content </a:t>
-            </a:r>
-            <a:r>
-              <a:rPr lang="en-US" dirty="0" smtClean="0"/>
-              <a:t>for all sequences in a given file</a:t>
-            </a:r>
-          </a:p>
-          <a:p>
-            <a:pPr marL="971550" lvl="1" indent="-514350"/>
-            <a:r>
-              <a:rPr lang="en-US" dirty="0"/>
-              <a:t>Your script should include two functions:</a:t>
-            </a:r>
-          </a:p>
-          <a:p>
-            <a:pPr marL="1657350" lvl="2" indent="-514350"/>
-            <a:r>
-              <a:rPr lang="en-US" dirty="0"/>
-              <a:t>A function for reading in a sequence file</a:t>
-            </a:r>
-          </a:p>
-          <a:p>
-            <a:pPr marL="1657350" lvl="2" indent="-514350"/>
-            <a:r>
-              <a:rPr lang="en-US" dirty="0"/>
-              <a:t>A function for computing </a:t>
-            </a:r>
-            <a:r>
-              <a:rPr lang="en-US" dirty="0" smtClean="0"/>
-              <a:t>the GC-content for a </a:t>
-            </a:r>
-            <a:r>
-              <a:rPr lang="en-US" i="1" dirty="0" smtClean="0"/>
-              <a:t>single sequence </a:t>
-            </a:r>
-            <a:r>
-              <a:rPr lang="en-US" dirty="0" smtClean="0">
-                <a:solidFill>
-                  <a:schemeClr val="accent5"/>
-                </a:solidFill>
-              </a:rPr>
-              <a:t>(why?)</a:t>
-            </a:r>
-            <a:endParaRPr lang="en-US" dirty="0">
-              <a:solidFill>
-                <a:schemeClr val="accent5"/>
-              </a:solidFill>
-            </a:endParaRPr>
-          </a:p>
-          <a:p>
-            <a:pPr marL="514350" indent="-514350">
-              <a:buFont typeface="+mj-lt"/>
-              <a:buAutoNum type="arabicPeriod" startAt="2"/>
-            </a:pPr>
-            <a:endParaRPr lang="en-US" dirty="0" smtClean="0"/>
-          </a:p>
-          <a:p>
-            <a:endParaRPr lang="en-US" dirty="0"/>
-          </a:p>
-          <a:p>
-            <a:endParaRPr lang="en-US" dirty="0"/>
-          </a:p>
-        </p:txBody>
-      </p:sp>
-    </p:spTree>
-    <p:extLst>
-      <p:ext uri="{BB962C8B-B14F-4D97-AF65-F5344CB8AC3E}">
-        <p14:creationId xmlns:p14="http://schemas.microsoft.com/office/powerpoint/2010/main" val="2044227144"/>
-      </p:ext>
-    </p:extLst>
-  </p:cSld>
-  <p:clrMapOvr>
-    <a:masterClrMapping/>
-  </p:clrMapOvr>
-</p:sld>
-</file>
-
-<file path=ppt/slides/slide29.xml><?xml version="1.0" encoding="utf-8"?>
-<p:sld xmlns:a="http://schemas.openxmlformats.org/drawingml/2006/main" xmlns:r="http://schemas.openxmlformats.org/officeDocument/2006/relationships" xmlns:p="http://schemas.openxmlformats.org/presentationml/2006/main">
-  <p:cSld>
-    <p:spTree>
-      <p:nvGrpSpPr>
-        <p:cNvPr id="1" name=""/>
-        <p:cNvGrpSpPr/>
-        <p:nvPr/>
-      </p:nvGrpSpPr>
-      <p:grpSpPr>
-        <a:xfrm>
-          <a:off x="0" y="0"/>
-          <a:ext cx="0" cy="0"/>
-          <a:chOff x="0" y="0"/>
-          <a:chExt cx="0" cy="0"/>
-        </a:xfrm>
-      </p:grpSpPr>
-      <p:sp>
-        <p:nvSpPr>
-          <p:cNvPr id="2" name="Title 1"/>
-          <p:cNvSpPr>
-            <a:spLocks noGrp="1"/>
-          </p:cNvSpPr>
-          <p:nvPr>
-            <p:ph type="title"/>
-          </p:nvPr>
-        </p:nvSpPr>
-        <p:spPr/>
-        <p:txBody>
-          <a:bodyPr/>
-          <a:lstStyle/>
-          <a:p>
-            <a:r>
-              <a:rPr lang="en-US" dirty="0" smtClean="0"/>
-              <a:t>Script #2</a:t>
-            </a:r>
-            <a:endParaRPr lang="en-US" dirty="0"/>
-          </a:p>
-        </p:txBody>
-      </p:sp>
-      <p:sp>
-        <p:nvSpPr>
-          <p:cNvPr id="3" name="Content Placeholder 2"/>
-          <p:cNvSpPr>
-            <a:spLocks noGrp="1"/>
-          </p:cNvSpPr>
-          <p:nvPr>
-            <p:ph idx="1"/>
-          </p:nvPr>
-        </p:nvSpPr>
-        <p:spPr/>
-        <p:txBody>
-          <a:bodyPr/>
-          <a:lstStyle/>
-          <a:p>
-            <a:r>
-              <a:rPr lang="en-US" dirty="0"/>
-              <a:t>Determine the </a:t>
-            </a:r>
-            <a:r>
-              <a:rPr lang="en-US" i="1" dirty="0"/>
-              <a:t>pairwise distance </a:t>
-            </a:r>
-            <a:r>
-              <a:rPr lang="en-US" dirty="0"/>
-              <a:t>between two sequences </a:t>
-            </a:r>
-          </a:p>
-        </p:txBody>
-      </p:sp>
-    </p:spTree>
-    <p:extLst>
-      <p:ext uri="{BB962C8B-B14F-4D97-AF65-F5344CB8AC3E}">
-        <p14:creationId xmlns:p14="http://schemas.microsoft.com/office/powerpoint/2010/main" val="3500402009"/>
-      </p:ext>
-    </p:extLst>
-  </p:cSld>
-  <p:clrMapOvr>
-    <a:masterClrMapping/>
-  </p:clrMapOvr>
-</p:sld>
-</file>
-
 <file path=ppt/slides/slide3.xml><?xml version="1.0" encoding="utf-8"?>
 <p:sld xmlns:a="http://schemas.openxmlformats.org/drawingml/2006/main" xmlns:r="http://schemas.openxmlformats.org/officeDocument/2006/relationships" xmlns:p="http://schemas.openxmlformats.org/presentationml/2006/main">
   <p:cSld>
@@ -8760,736 +8331,6 @@
     <p:extLst>
       <p:ext uri="{BB962C8B-B14F-4D97-AF65-F5344CB8AC3E}">
         <p14:creationId xmlns:p14="http://schemas.microsoft.com/office/powerpoint/2010/main" val="3140848450"/>
-      </p:ext>
-    </p:extLst>
-  </p:cSld>
-  <p:clrMapOvr>
-    <a:masterClrMapping/>
-  </p:clrMapOvr>
-</p:sld>
-</file>
-
-<file path=ppt/slides/slide30.xml><?xml version="1.0" encoding="utf-8"?>
-<p:sld xmlns:a="http://schemas.openxmlformats.org/drawingml/2006/main" xmlns:r="http://schemas.openxmlformats.org/officeDocument/2006/relationships" xmlns:p="http://schemas.openxmlformats.org/presentationml/2006/main">
-  <p:cSld>
-    <p:spTree>
-      <p:nvGrpSpPr>
-        <p:cNvPr id="1" name=""/>
-        <p:cNvGrpSpPr/>
-        <p:nvPr/>
-      </p:nvGrpSpPr>
-      <p:grpSpPr>
-        <a:xfrm>
-          <a:off x="0" y="0"/>
-          <a:ext cx="0" cy="0"/>
-          <a:chOff x="0" y="0"/>
-          <a:chExt cx="0" cy="0"/>
-        </a:xfrm>
-      </p:grpSpPr>
-      <p:sp>
-        <p:nvSpPr>
-          <p:cNvPr id="2" name="Title 1"/>
-          <p:cNvSpPr>
-            <a:spLocks noGrp="1"/>
-          </p:cNvSpPr>
-          <p:nvPr>
-            <p:ph type="title"/>
-          </p:nvPr>
-        </p:nvSpPr>
-        <p:spPr/>
-        <p:txBody>
-          <a:bodyPr/>
-          <a:lstStyle/>
-          <a:p>
-            <a:r>
-              <a:rPr lang="en-US" dirty="0" smtClean="0"/>
-              <a:t>Script #2</a:t>
-            </a:r>
-            <a:endParaRPr lang="en-US" dirty="0"/>
-          </a:p>
-        </p:txBody>
-      </p:sp>
-      <p:sp>
-        <p:nvSpPr>
-          <p:cNvPr id="3" name="Content Placeholder 2"/>
-          <p:cNvSpPr>
-            <a:spLocks noGrp="1"/>
-          </p:cNvSpPr>
-          <p:nvPr>
-            <p:ph idx="1"/>
-          </p:nvPr>
-        </p:nvSpPr>
-        <p:spPr/>
-        <p:txBody>
-          <a:bodyPr/>
-          <a:lstStyle/>
-          <a:p>
-            <a:r>
-              <a:rPr lang="en-US" dirty="0"/>
-              <a:t>Determine the </a:t>
-            </a:r>
-            <a:r>
-              <a:rPr lang="en-US" i="1" dirty="0"/>
-              <a:t>pairwise distance </a:t>
-            </a:r>
-            <a:r>
-              <a:rPr lang="en-US" dirty="0"/>
-              <a:t>between two sequences </a:t>
-            </a:r>
-          </a:p>
-        </p:txBody>
-      </p:sp>
-      <p:sp>
-        <p:nvSpPr>
-          <p:cNvPr id="4" name="TextBox 3"/>
-          <p:cNvSpPr txBox="1"/>
-          <p:nvPr/>
-        </p:nvSpPr>
-        <p:spPr>
-          <a:xfrm>
-            <a:off x="3448439" y="2892195"/>
-            <a:ext cx="1653765" cy="892552"/>
-          </a:xfrm>
-          <a:prstGeom prst="rect">
-            <a:avLst/>
-          </a:prstGeom>
-          <a:noFill/>
-        </p:spPr>
-        <p:txBody>
-          <a:bodyPr wrap="square" rtlCol="0">
-            <a:spAutoFit/>
-          </a:bodyPr>
-          <a:lstStyle/>
-          <a:p>
-            <a:r>
-              <a:rPr lang="en-US" sz="2600" dirty="0" smtClean="0">
-                <a:latin typeface="Monaco"/>
-                <a:cs typeface="Monaco"/>
-              </a:rPr>
-              <a:t>ACGTAAA</a:t>
-            </a:r>
-          </a:p>
-          <a:p>
-            <a:r>
-              <a:rPr lang="en-US" sz="2600" dirty="0" smtClean="0">
-                <a:latin typeface="Monaco"/>
-                <a:cs typeface="Monaco"/>
-              </a:rPr>
-              <a:t>AGGTAAT</a:t>
-            </a:r>
-          </a:p>
-        </p:txBody>
-      </p:sp>
-    </p:spTree>
-    <p:extLst>
-      <p:ext uri="{BB962C8B-B14F-4D97-AF65-F5344CB8AC3E}">
-        <p14:creationId xmlns:p14="http://schemas.microsoft.com/office/powerpoint/2010/main" val="115094946"/>
-      </p:ext>
-    </p:extLst>
-  </p:cSld>
-  <p:clrMapOvr>
-    <a:masterClrMapping/>
-  </p:clrMapOvr>
-</p:sld>
-</file>
-
-<file path=ppt/slides/slide31.xml><?xml version="1.0" encoding="utf-8"?>
-<p:sld xmlns:a="http://schemas.openxmlformats.org/drawingml/2006/main" xmlns:r="http://schemas.openxmlformats.org/officeDocument/2006/relationships" xmlns:p="http://schemas.openxmlformats.org/presentationml/2006/main">
-  <p:cSld>
-    <p:spTree>
-      <p:nvGrpSpPr>
-        <p:cNvPr id="1" name=""/>
-        <p:cNvGrpSpPr/>
-        <p:nvPr/>
-      </p:nvGrpSpPr>
-      <p:grpSpPr>
-        <a:xfrm>
-          <a:off x="0" y="0"/>
-          <a:ext cx="0" cy="0"/>
-          <a:chOff x="0" y="0"/>
-          <a:chExt cx="0" cy="0"/>
-        </a:xfrm>
-      </p:grpSpPr>
-      <p:sp>
-        <p:nvSpPr>
-          <p:cNvPr id="2" name="Title 1"/>
-          <p:cNvSpPr>
-            <a:spLocks noGrp="1"/>
-          </p:cNvSpPr>
-          <p:nvPr>
-            <p:ph type="title"/>
-          </p:nvPr>
-        </p:nvSpPr>
-        <p:spPr/>
-        <p:txBody>
-          <a:bodyPr/>
-          <a:lstStyle/>
-          <a:p>
-            <a:r>
-              <a:rPr lang="en-US" dirty="0" smtClean="0"/>
-              <a:t>Script #2</a:t>
-            </a:r>
-            <a:endParaRPr lang="en-US" dirty="0"/>
-          </a:p>
-        </p:txBody>
-      </p:sp>
-      <p:sp>
-        <p:nvSpPr>
-          <p:cNvPr id="3" name="Content Placeholder 2"/>
-          <p:cNvSpPr>
-            <a:spLocks noGrp="1"/>
-          </p:cNvSpPr>
-          <p:nvPr>
-            <p:ph idx="1"/>
-          </p:nvPr>
-        </p:nvSpPr>
-        <p:spPr/>
-        <p:txBody>
-          <a:bodyPr/>
-          <a:lstStyle/>
-          <a:p>
-            <a:r>
-              <a:rPr lang="en-US" dirty="0"/>
-              <a:t>Determine the </a:t>
-            </a:r>
-            <a:r>
-              <a:rPr lang="en-US" i="1" dirty="0"/>
-              <a:t>pairwise distance </a:t>
-            </a:r>
-            <a:r>
-              <a:rPr lang="en-US" dirty="0"/>
-              <a:t>between two sequences </a:t>
-            </a:r>
-          </a:p>
-        </p:txBody>
-      </p:sp>
-      <p:sp>
-        <p:nvSpPr>
-          <p:cNvPr id="4" name="TextBox 3"/>
-          <p:cNvSpPr txBox="1"/>
-          <p:nvPr/>
-        </p:nvSpPr>
-        <p:spPr>
-          <a:xfrm>
-            <a:off x="3448439" y="2892195"/>
-            <a:ext cx="1653765" cy="892552"/>
-          </a:xfrm>
-          <a:prstGeom prst="rect">
-            <a:avLst/>
-          </a:prstGeom>
-          <a:noFill/>
-        </p:spPr>
-        <p:txBody>
-          <a:bodyPr wrap="square" rtlCol="0">
-            <a:spAutoFit/>
-          </a:bodyPr>
-          <a:lstStyle/>
-          <a:p>
-            <a:r>
-              <a:rPr lang="en-US" sz="2600" dirty="0" smtClean="0">
-                <a:latin typeface="Monaco"/>
-                <a:cs typeface="Monaco"/>
-              </a:rPr>
-              <a:t>A</a:t>
-            </a:r>
-            <a:r>
-              <a:rPr lang="en-US" sz="2600" dirty="0" smtClean="0">
-                <a:solidFill>
-                  <a:schemeClr val="tx2"/>
-                </a:solidFill>
-                <a:latin typeface="Monaco"/>
-                <a:cs typeface="Monaco"/>
-              </a:rPr>
-              <a:t>C</a:t>
-            </a:r>
-            <a:r>
-              <a:rPr lang="en-US" sz="2600" dirty="0" smtClean="0">
-                <a:latin typeface="Monaco"/>
-                <a:cs typeface="Monaco"/>
-              </a:rPr>
-              <a:t>GTAA</a:t>
-            </a:r>
-            <a:r>
-              <a:rPr lang="en-US" sz="2600" dirty="0" smtClean="0">
-                <a:solidFill>
-                  <a:srgbClr val="D1282E"/>
-                </a:solidFill>
-                <a:latin typeface="Monaco"/>
-                <a:cs typeface="Monaco"/>
-              </a:rPr>
-              <a:t>A</a:t>
-            </a:r>
-          </a:p>
-          <a:p>
-            <a:r>
-              <a:rPr lang="en-US" sz="2600" dirty="0" smtClean="0">
-                <a:latin typeface="Monaco"/>
-                <a:cs typeface="Monaco"/>
-              </a:rPr>
-              <a:t>A</a:t>
-            </a:r>
-            <a:r>
-              <a:rPr lang="en-US" sz="2600" dirty="0" smtClean="0">
-                <a:solidFill>
-                  <a:srgbClr val="D1282E"/>
-                </a:solidFill>
-                <a:latin typeface="Monaco"/>
-                <a:cs typeface="Monaco"/>
-              </a:rPr>
-              <a:t>G</a:t>
-            </a:r>
-            <a:r>
-              <a:rPr lang="en-US" sz="2600" dirty="0" smtClean="0">
-                <a:latin typeface="Monaco"/>
-                <a:cs typeface="Monaco"/>
-              </a:rPr>
-              <a:t>GTAA</a:t>
-            </a:r>
-            <a:r>
-              <a:rPr lang="en-US" sz="2600" dirty="0" smtClean="0">
-                <a:solidFill>
-                  <a:srgbClr val="D1282E"/>
-                </a:solidFill>
-                <a:latin typeface="Monaco"/>
-                <a:cs typeface="Monaco"/>
-              </a:rPr>
-              <a:t>T</a:t>
-            </a:r>
-          </a:p>
-        </p:txBody>
-      </p:sp>
-      <p:sp>
-        <p:nvSpPr>
-          <p:cNvPr id="5" name="TextBox 4"/>
-          <p:cNvSpPr txBox="1"/>
-          <p:nvPr/>
-        </p:nvSpPr>
-        <p:spPr>
-          <a:xfrm>
-            <a:off x="5279738" y="3015306"/>
-            <a:ext cx="3421834" cy="769441"/>
-          </a:xfrm>
-          <a:prstGeom prst="rect">
-            <a:avLst/>
-          </a:prstGeom>
-          <a:noFill/>
-        </p:spPr>
-        <p:txBody>
-          <a:bodyPr wrap="square" rtlCol="0">
-            <a:spAutoFit/>
-          </a:bodyPr>
-          <a:lstStyle/>
-          <a:p>
-            <a:r>
-              <a:rPr lang="en-US" sz="2200" dirty="0" smtClean="0">
-                <a:solidFill>
-                  <a:srgbClr val="DC5924"/>
-                </a:solidFill>
-              </a:rPr>
-              <a:t>Distance = #diff / length  =</a:t>
-            </a:r>
-          </a:p>
-          <a:p>
-            <a:r>
-              <a:rPr lang="en-US" sz="2200" dirty="0" smtClean="0">
-                <a:solidFill>
-                  <a:srgbClr val="DC5924"/>
-                </a:solidFill>
-              </a:rPr>
-              <a:t> 2 / 7 = 0.286 </a:t>
-            </a:r>
-            <a:endParaRPr lang="en-US" sz="2200" dirty="0">
-              <a:solidFill>
-                <a:srgbClr val="DC5924"/>
-              </a:solidFill>
-              <a:latin typeface="Monaco"/>
-              <a:cs typeface="Monaco"/>
-            </a:endParaRPr>
-          </a:p>
-        </p:txBody>
-      </p:sp>
-    </p:spTree>
-    <p:extLst>
-      <p:ext uri="{BB962C8B-B14F-4D97-AF65-F5344CB8AC3E}">
-        <p14:creationId xmlns:p14="http://schemas.microsoft.com/office/powerpoint/2010/main" val="274318404"/>
-      </p:ext>
-    </p:extLst>
-  </p:cSld>
-  <p:clrMapOvr>
-    <a:masterClrMapping/>
-  </p:clrMapOvr>
-</p:sld>
-</file>
-
-<file path=ppt/slides/slide32.xml><?xml version="1.0" encoding="utf-8"?>
-<p:sld xmlns:a="http://schemas.openxmlformats.org/drawingml/2006/main" xmlns:r="http://schemas.openxmlformats.org/officeDocument/2006/relationships" xmlns:p="http://schemas.openxmlformats.org/presentationml/2006/main">
-  <p:cSld>
-    <p:spTree>
-      <p:nvGrpSpPr>
-        <p:cNvPr id="1" name=""/>
-        <p:cNvGrpSpPr/>
-        <p:nvPr/>
-      </p:nvGrpSpPr>
-      <p:grpSpPr>
-        <a:xfrm>
-          <a:off x="0" y="0"/>
-          <a:ext cx="0" cy="0"/>
-          <a:chOff x="0" y="0"/>
-          <a:chExt cx="0" cy="0"/>
-        </a:xfrm>
-      </p:grpSpPr>
-      <p:sp>
-        <p:nvSpPr>
-          <p:cNvPr id="2" name="Title 1"/>
-          <p:cNvSpPr>
-            <a:spLocks noGrp="1"/>
-          </p:cNvSpPr>
-          <p:nvPr>
-            <p:ph type="title"/>
-          </p:nvPr>
-        </p:nvSpPr>
-        <p:spPr/>
-        <p:txBody>
-          <a:bodyPr/>
-          <a:lstStyle/>
-          <a:p>
-            <a:r>
-              <a:rPr lang="en-US" dirty="0" smtClean="0"/>
-              <a:t>Script #2</a:t>
-            </a:r>
-            <a:endParaRPr lang="en-US" dirty="0"/>
-          </a:p>
-        </p:txBody>
-      </p:sp>
-      <p:sp>
-        <p:nvSpPr>
-          <p:cNvPr id="3" name="Content Placeholder 2"/>
-          <p:cNvSpPr>
-            <a:spLocks noGrp="1"/>
-          </p:cNvSpPr>
-          <p:nvPr>
-            <p:ph idx="1"/>
-          </p:nvPr>
-        </p:nvSpPr>
-        <p:spPr/>
-        <p:txBody>
-          <a:bodyPr/>
-          <a:lstStyle/>
-          <a:p>
-            <a:r>
-              <a:rPr lang="en-US" dirty="0" smtClean="0"/>
-              <a:t>Determine the </a:t>
-            </a:r>
-            <a:r>
-              <a:rPr lang="en-US" i="1" dirty="0" smtClean="0"/>
-              <a:t>pairwise distance </a:t>
-            </a:r>
-            <a:r>
-              <a:rPr lang="en-US" dirty="0" smtClean="0"/>
-              <a:t>between two sequences </a:t>
-            </a:r>
-          </a:p>
-          <a:p>
-            <a:pPr marL="971550" lvl="1" indent="-514350"/>
-            <a:r>
-              <a:rPr lang="en-US" dirty="0" smtClean="0"/>
-              <a:t>Your script should include two functions:</a:t>
-            </a:r>
-          </a:p>
-          <a:p>
-            <a:pPr marL="1657350" lvl="2" indent="-514350"/>
-            <a:r>
-              <a:rPr lang="en-US" dirty="0" smtClean="0"/>
-              <a:t>A function for reading in a sequence file</a:t>
-            </a:r>
-          </a:p>
-          <a:p>
-            <a:pPr marL="1657350" lvl="2" indent="-514350"/>
-            <a:r>
-              <a:rPr lang="en-US" dirty="0" smtClean="0"/>
-              <a:t>A function for computing pair-wise distances</a:t>
-            </a:r>
-          </a:p>
-        </p:txBody>
-      </p:sp>
-    </p:spTree>
-    <p:extLst>
-      <p:ext uri="{BB962C8B-B14F-4D97-AF65-F5344CB8AC3E}">
-        <p14:creationId xmlns:p14="http://schemas.microsoft.com/office/powerpoint/2010/main" val="3387817876"/>
-      </p:ext>
-    </p:extLst>
-  </p:cSld>
-  <p:clrMapOvr>
-    <a:masterClrMapping/>
-  </p:clrMapOvr>
-</p:sld>
-</file>
-
-<file path=ppt/slides/slide33.xml><?xml version="1.0" encoding="utf-8"?>
-<p:sld xmlns:a="http://schemas.openxmlformats.org/drawingml/2006/main" xmlns:r="http://schemas.openxmlformats.org/officeDocument/2006/relationships" xmlns:p="http://schemas.openxmlformats.org/presentationml/2006/main">
-  <p:cSld>
-    <p:spTree>
-      <p:nvGrpSpPr>
-        <p:cNvPr id="1" name=""/>
-        <p:cNvGrpSpPr/>
-        <p:nvPr/>
-      </p:nvGrpSpPr>
-      <p:grpSpPr>
-        <a:xfrm>
-          <a:off x="0" y="0"/>
-          <a:ext cx="0" cy="0"/>
-          <a:chOff x="0" y="0"/>
-          <a:chExt cx="0" cy="0"/>
-        </a:xfrm>
-      </p:grpSpPr>
-      <p:sp>
-        <p:nvSpPr>
-          <p:cNvPr id="2" name="Title 1"/>
-          <p:cNvSpPr>
-            <a:spLocks noGrp="1"/>
-          </p:cNvSpPr>
-          <p:nvPr>
-            <p:ph type="title"/>
-          </p:nvPr>
-        </p:nvSpPr>
-        <p:spPr/>
-        <p:txBody>
-          <a:bodyPr/>
-          <a:lstStyle/>
-          <a:p>
-            <a:r>
-              <a:rPr lang="en-US" dirty="0" smtClean="0"/>
-              <a:t>Script #2</a:t>
-            </a:r>
-            <a:endParaRPr lang="en-US" dirty="0"/>
-          </a:p>
-        </p:txBody>
-      </p:sp>
-      <p:sp>
-        <p:nvSpPr>
-          <p:cNvPr id="3" name="Content Placeholder 2"/>
-          <p:cNvSpPr>
-            <a:spLocks noGrp="1"/>
-          </p:cNvSpPr>
-          <p:nvPr>
-            <p:ph idx="1"/>
-          </p:nvPr>
-        </p:nvSpPr>
-        <p:spPr/>
-        <p:txBody>
-          <a:bodyPr/>
-          <a:lstStyle/>
-          <a:p>
-            <a:r>
-              <a:rPr lang="en-US" dirty="0"/>
-              <a:t>Determine the </a:t>
-            </a:r>
-            <a:r>
-              <a:rPr lang="en-US" i="1" dirty="0"/>
-              <a:t>pairwise distance </a:t>
-            </a:r>
-            <a:r>
-              <a:rPr lang="en-US" dirty="0"/>
-              <a:t>between two sequences </a:t>
-            </a:r>
-          </a:p>
-          <a:p>
-            <a:pPr marL="971550" lvl="1" indent="-514350"/>
-            <a:r>
-              <a:rPr lang="en-US" dirty="0" smtClean="0"/>
-              <a:t>Your script should include two functions:</a:t>
-            </a:r>
-          </a:p>
-          <a:p>
-            <a:pPr marL="1657350" lvl="2" indent="-514350"/>
-            <a:r>
-              <a:rPr lang="en-US" dirty="0" smtClean="0"/>
-              <a:t>A function for reading in a sequence file</a:t>
-            </a:r>
-          </a:p>
-          <a:p>
-            <a:pPr marL="1657350" lvl="2" indent="-514350"/>
-            <a:r>
-              <a:rPr lang="en-US" dirty="0" smtClean="0"/>
-              <a:t>A function for computing pair-wise distances</a:t>
-            </a:r>
-          </a:p>
-          <a:p>
-            <a:pPr marL="971550" lvl="1" indent="-514350"/>
-            <a:endParaRPr lang="en-US" dirty="0"/>
-          </a:p>
-          <a:p>
-            <a:pPr marL="971550" lvl="1" indent="-514350"/>
-            <a:r>
-              <a:rPr lang="en-US" dirty="0" smtClean="0"/>
-              <a:t>Important considerations:</a:t>
-            </a:r>
-          </a:p>
-          <a:p>
-            <a:pPr marL="1657350" lvl="2" indent="-514350"/>
-            <a:r>
-              <a:rPr lang="en-US" dirty="0" smtClean="0"/>
-              <a:t>Allow for different sequence file formats</a:t>
-            </a:r>
-          </a:p>
-          <a:p>
-            <a:pPr marL="1657350" lvl="2" indent="-514350"/>
-            <a:r>
-              <a:rPr lang="en-US" dirty="0" smtClean="0"/>
-              <a:t>The sequences must be the same length</a:t>
-            </a:r>
-          </a:p>
-          <a:p>
-            <a:pPr marL="1657350" lvl="2" indent="-514350"/>
-            <a:endParaRPr lang="en-US" dirty="0" smtClean="0"/>
-          </a:p>
-        </p:txBody>
-      </p:sp>
-    </p:spTree>
-    <p:extLst>
-      <p:ext uri="{BB962C8B-B14F-4D97-AF65-F5344CB8AC3E}">
-        <p14:creationId xmlns:p14="http://schemas.microsoft.com/office/powerpoint/2010/main" val="1669645551"/>
-      </p:ext>
-    </p:extLst>
-  </p:cSld>
-  <p:clrMapOvr>
-    <a:masterClrMapping/>
-  </p:clrMapOvr>
-</p:sld>
-</file>
-
-<file path=ppt/slides/slide34.xml><?xml version="1.0" encoding="utf-8"?>
-<p:sld xmlns:a="http://schemas.openxmlformats.org/drawingml/2006/main" xmlns:r="http://schemas.openxmlformats.org/officeDocument/2006/relationships" xmlns:p="http://schemas.openxmlformats.org/presentationml/2006/main">
-  <p:cSld>
-    <p:spTree>
-      <p:nvGrpSpPr>
-        <p:cNvPr id="1" name=""/>
-        <p:cNvGrpSpPr/>
-        <p:nvPr/>
-      </p:nvGrpSpPr>
-      <p:grpSpPr>
-        <a:xfrm>
-          <a:off x="0" y="0"/>
-          <a:ext cx="0" cy="0"/>
-          <a:chOff x="0" y="0"/>
-          <a:chExt cx="0" cy="0"/>
-        </a:xfrm>
-      </p:grpSpPr>
-      <p:sp>
-        <p:nvSpPr>
-          <p:cNvPr id="2" name="Title 1"/>
-          <p:cNvSpPr>
-            <a:spLocks noGrp="1"/>
-          </p:cNvSpPr>
-          <p:nvPr>
-            <p:ph type="title"/>
-          </p:nvPr>
-        </p:nvSpPr>
-        <p:spPr/>
-        <p:txBody>
-          <a:bodyPr/>
-          <a:lstStyle/>
-          <a:p>
-            <a:r>
-              <a:rPr lang="en-US" dirty="0" smtClean="0"/>
-              <a:t>Script #2</a:t>
-            </a:r>
-            <a:endParaRPr lang="en-US" dirty="0"/>
-          </a:p>
-        </p:txBody>
-      </p:sp>
-      <p:sp>
-        <p:nvSpPr>
-          <p:cNvPr id="3" name="Content Placeholder 2"/>
-          <p:cNvSpPr>
-            <a:spLocks noGrp="1"/>
-          </p:cNvSpPr>
-          <p:nvPr>
-            <p:ph idx="1"/>
-          </p:nvPr>
-        </p:nvSpPr>
-        <p:spPr/>
-        <p:txBody>
-          <a:bodyPr/>
-          <a:lstStyle/>
-          <a:p>
-            <a:r>
-              <a:rPr lang="en-US" dirty="0"/>
-              <a:t>Determine the </a:t>
-            </a:r>
-            <a:r>
-              <a:rPr lang="en-US" i="1" dirty="0"/>
-              <a:t>pairwise distance </a:t>
-            </a:r>
-            <a:r>
-              <a:rPr lang="en-US" dirty="0"/>
-              <a:t>between two sequences </a:t>
-            </a:r>
-          </a:p>
-          <a:p>
-            <a:pPr marL="971550" lvl="1" indent="-514350"/>
-            <a:r>
-              <a:rPr lang="en-US" dirty="0" smtClean="0"/>
-              <a:t>Your script should include two functions:</a:t>
-            </a:r>
-          </a:p>
-          <a:p>
-            <a:pPr marL="1657350" lvl="2" indent="-514350"/>
-            <a:r>
-              <a:rPr lang="en-US" dirty="0" smtClean="0"/>
-              <a:t>A function for reading in a sequence file</a:t>
-            </a:r>
-          </a:p>
-          <a:p>
-            <a:pPr marL="1657350" lvl="2" indent="-514350"/>
-            <a:r>
-              <a:rPr lang="en-US" dirty="0" smtClean="0"/>
-              <a:t>A function for computing pair-wise distances</a:t>
-            </a:r>
-          </a:p>
-          <a:p>
-            <a:pPr marL="971550" lvl="1" indent="-514350"/>
-            <a:endParaRPr lang="en-US" dirty="0"/>
-          </a:p>
-          <a:p>
-            <a:pPr marL="971550" lvl="1" indent="-514350"/>
-            <a:r>
-              <a:rPr lang="en-US" dirty="0" smtClean="0"/>
-              <a:t>Important considerations:</a:t>
-            </a:r>
-          </a:p>
-          <a:p>
-            <a:pPr marL="1657350" lvl="2" indent="-514350"/>
-            <a:r>
-              <a:rPr lang="en-US" dirty="0" smtClean="0"/>
-              <a:t>Allow for different sequence file formats</a:t>
-            </a:r>
-          </a:p>
-          <a:p>
-            <a:pPr marL="1657350" lvl="2" indent="-514350"/>
-            <a:r>
-              <a:rPr lang="en-US" dirty="0" smtClean="0"/>
-              <a:t>The sequences must be the same length </a:t>
-            </a:r>
-            <a:r>
-              <a:rPr lang="en-US" dirty="0" smtClean="0">
-                <a:solidFill>
-                  <a:schemeClr val="accent5"/>
-                </a:solidFill>
-              </a:rPr>
-              <a:t>(how can we enforce this?)</a:t>
-            </a:r>
-          </a:p>
-          <a:p>
-            <a:pPr marL="1657350" lvl="2" indent="-514350"/>
-            <a:endParaRPr lang="en-US" dirty="0" smtClean="0"/>
-          </a:p>
-        </p:txBody>
-      </p:sp>
-    </p:spTree>
-    <p:extLst>
-      <p:ext uri="{BB962C8B-B14F-4D97-AF65-F5344CB8AC3E}">
-        <p14:creationId xmlns:p14="http://schemas.microsoft.com/office/powerpoint/2010/main" val="2457218753"/>
       </p:ext>
     </p:extLst>
   </p:cSld>

</xml_diff>